<commit_message>
A few more fixes
</commit_message>
<xml_diff>
--- a/plots.pptx
+++ b/plots.pptx
@@ -5,13 +5,14 @@
     <p:sldMasterId id="2147483648" r:id="rId1"/>
   </p:sldMasterIdLst>
   <p:notesMasterIdLst>
-    <p:notesMasterId r:id="rId6"/>
+    <p:notesMasterId r:id="rId7"/>
   </p:notesMasterIdLst>
   <p:sldIdLst>
-    <p:sldId id="256" r:id="rId2"/>
-    <p:sldId id="257" r:id="rId3"/>
-    <p:sldId id="258" r:id="rId4"/>
-    <p:sldId id="259" r:id="rId5"/>
+    <p:sldId id="260" r:id="rId2"/>
+    <p:sldId id="256" r:id="rId3"/>
+    <p:sldId id="257" r:id="rId4"/>
+    <p:sldId id="258" r:id="rId5"/>
+    <p:sldId id="259" r:id="rId6"/>
   </p:sldIdLst>
   <p:sldSz cx="12192000" cy="6858000"/>
   <p:notesSz cx="6858000" cy="9144000"/>
@@ -532,7 +533,7 @@
           <a:p>
             <a:fld id="{DE9BC2B2-F088-3A4B-930B-4E0993B3CF0C}" type="slidenum">
               <a:rPr lang="en-US" smtClean="0"/>
-              <a:t>2</a:t>
+              <a:t>3</a:t>
             </a:fld>
             <a:endParaRPr lang="en-US"/>
           </a:p>
@@ -616,7 +617,7 @@
           <a:p>
             <a:fld id="{DE9BC2B2-F088-3A4B-930B-4E0993B3CF0C}" type="slidenum">
               <a:rPr lang="en-US" smtClean="0"/>
-              <a:t>3</a:t>
+              <a:t>4</a:t>
             </a:fld>
             <a:endParaRPr lang="en-US"/>
           </a:p>
@@ -700,7 +701,7 @@
           <a:p>
             <a:fld id="{DE9BC2B2-F088-3A4B-930B-4E0993B3CF0C}" type="slidenum">
               <a:rPr lang="en-US" smtClean="0"/>
-              <a:t>4</a:t>
+              <a:t>5</a:t>
             </a:fld>
             <a:endParaRPr lang="en-US"/>
           </a:p>
@@ -3935,6 +3936,641 @@
       </p:grpSpPr>
       <p:cxnSp>
         <p:nvCxnSpPr>
+          <p:cNvPr id="14" name="Straight Connector 13">
+            <a:extLst>
+              <a:ext uri="{FF2B5EF4-FFF2-40B4-BE49-F238E27FC236}">
+                <a16:creationId xmlns:a16="http://schemas.microsoft.com/office/drawing/2014/main" id="{4EFB5453-A69E-334D-8117-5B6950FBA6F3}"/>
+              </a:ext>
+            </a:extLst>
+          </p:cNvPr>
+          <p:cNvCxnSpPr>
+            <a:cxnSpLocks/>
+          </p:cNvCxnSpPr>
+          <p:nvPr/>
+        </p:nvCxnSpPr>
+        <p:spPr>
+          <a:xfrm>
+            <a:off x="2704563" y="746975"/>
+            <a:ext cx="0" cy="4082602"/>
+          </a:xfrm>
+          <a:prstGeom prst="line">
+            <a:avLst/>
+          </a:prstGeom>
+          <a:ln w="25400"/>
+        </p:spPr>
+        <p:style>
+          <a:lnRef idx="1">
+            <a:schemeClr val="dk1"/>
+          </a:lnRef>
+          <a:fillRef idx="0">
+            <a:schemeClr val="dk1"/>
+          </a:fillRef>
+          <a:effectRef idx="0">
+            <a:schemeClr val="dk1"/>
+          </a:effectRef>
+          <a:fontRef idx="minor">
+            <a:schemeClr val="tx1"/>
+          </a:fontRef>
+        </p:style>
+      </p:cxnSp>
+      <p:cxnSp>
+        <p:nvCxnSpPr>
+          <p:cNvPr id="15" name="Straight Connector 14">
+            <a:extLst>
+              <a:ext uri="{FF2B5EF4-FFF2-40B4-BE49-F238E27FC236}">
+                <a16:creationId xmlns:a16="http://schemas.microsoft.com/office/drawing/2014/main" id="{A12E574E-AB15-3346-B849-6CC5BBF2A58C}"/>
+              </a:ext>
+            </a:extLst>
+          </p:cNvPr>
+          <p:cNvCxnSpPr>
+            <a:cxnSpLocks/>
+          </p:cNvCxnSpPr>
+          <p:nvPr/>
+        </p:nvCxnSpPr>
+        <p:spPr>
+          <a:xfrm>
+            <a:off x="2704563" y="4829577"/>
+            <a:ext cx="4494727" cy="0"/>
+          </a:xfrm>
+          <a:prstGeom prst="line">
+            <a:avLst/>
+          </a:prstGeom>
+          <a:ln w="25400"/>
+        </p:spPr>
+        <p:style>
+          <a:lnRef idx="1">
+            <a:schemeClr val="dk1"/>
+          </a:lnRef>
+          <a:fillRef idx="0">
+            <a:schemeClr val="dk1"/>
+          </a:fillRef>
+          <a:effectRef idx="0">
+            <a:schemeClr val="dk1"/>
+          </a:effectRef>
+          <a:fontRef idx="minor">
+            <a:schemeClr val="tx1"/>
+          </a:fontRef>
+        </p:style>
+      </p:cxnSp>
+      <p:cxnSp>
+        <p:nvCxnSpPr>
+          <p:cNvPr id="25" name="Straight Connector 24">
+            <a:extLst>
+              <a:ext uri="{FF2B5EF4-FFF2-40B4-BE49-F238E27FC236}">
+                <a16:creationId xmlns:a16="http://schemas.microsoft.com/office/drawing/2014/main" id="{024468D5-586B-CC4B-AC9E-EBBDF1E114D3}"/>
+              </a:ext>
+            </a:extLst>
+          </p:cNvPr>
+          <p:cNvCxnSpPr>
+            <a:cxnSpLocks/>
+          </p:cNvCxnSpPr>
+          <p:nvPr/>
+        </p:nvCxnSpPr>
+        <p:spPr>
+          <a:xfrm flipV="1">
+            <a:off x="3643053" y="1895401"/>
+            <a:ext cx="2389612" cy="1741714"/>
+          </a:xfrm>
+          <a:prstGeom prst="line">
+            <a:avLst/>
+          </a:prstGeom>
+          <a:ln w="50800">
+            <a:solidFill>
+              <a:schemeClr val="accent1">
+                <a:alpha val="50000"/>
+              </a:schemeClr>
+            </a:solidFill>
+          </a:ln>
+        </p:spPr>
+        <p:style>
+          <a:lnRef idx="1">
+            <a:schemeClr val="accent1"/>
+          </a:lnRef>
+          <a:fillRef idx="0">
+            <a:schemeClr val="accent1"/>
+          </a:fillRef>
+          <a:effectRef idx="0">
+            <a:schemeClr val="accent1"/>
+          </a:effectRef>
+          <a:fontRef idx="minor">
+            <a:schemeClr val="tx1"/>
+          </a:fontRef>
+        </p:style>
+      </p:cxnSp>
+      <p:sp>
+        <p:nvSpPr>
+          <p:cNvPr id="27" name="Oval 26">
+            <a:extLst>
+              <a:ext uri="{FF2B5EF4-FFF2-40B4-BE49-F238E27FC236}">
+                <a16:creationId xmlns:a16="http://schemas.microsoft.com/office/drawing/2014/main" id="{4FD35402-7E17-CF4E-860B-183382C59D40}"/>
+              </a:ext>
+            </a:extLst>
+          </p:cNvPr>
+          <p:cNvSpPr/>
+          <p:nvPr/>
+        </p:nvSpPr>
+        <p:spPr>
+          <a:xfrm>
+            <a:off x="3574473" y="3568535"/>
+            <a:ext cx="137160" cy="137160"/>
+          </a:xfrm>
+          <a:prstGeom prst="ellipse">
+            <a:avLst/>
+          </a:prstGeom>
+          <a:solidFill>
+            <a:schemeClr val="accent6"/>
+          </a:solidFill>
+          <a:ln>
+            <a:noFill/>
+          </a:ln>
+        </p:spPr>
+        <p:style>
+          <a:lnRef idx="2">
+            <a:schemeClr val="accent1">
+              <a:shade val="50000"/>
+            </a:schemeClr>
+          </a:lnRef>
+          <a:fillRef idx="1">
+            <a:schemeClr val="accent1"/>
+          </a:fillRef>
+          <a:effectRef idx="0">
+            <a:schemeClr val="accent1"/>
+          </a:effectRef>
+          <a:fontRef idx="minor">
+            <a:schemeClr val="lt1"/>
+          </a:fontRef>
+        </p:style>
+        <p:txBody>
+          <a:bodyPr rtlCol="0" anchor="ctr"/>
+          <a:lstStyle/>
+          <a:p>
+            <a:pPr algn="ctr"/>
+            <a:endParaRPr lang="en-US" dirty="0"/>
+          </a:p>
+        </p:txBody>
+      </p:sp>
+      <p:sp>
+        <p:nvSpPr>
+          <p:cNvPr id="28" name="Oval 27">
+            <a:extLst>
+              <a:ext uri="{FF2B5EF4-FFF2-40B4-BE49-F238E27FC236}">
+                <a16:creationId xmlns:a16="http://schemas.microsoft.com/office/drawing/2014/main" id="{9EB476FC-8DAE-C848-8917-2C2E48DE99F0}"/>
+              </a:ext>
+            </a:extLst>
+          </p:cNvPr>
+          <p:cNvSpPr/>
+          <p:nvPr/>
+        </p:nvSpPr>
+        <p:spPr>
+          <a:xfrm>
+            <a:off x="5977939" y="1826821"/>
+            <a:ext cx="137160" cy="137160"/>
+          </a:xfrm>
+          <a:prstGeom prst="ellipse">
+            <a:avLst/>
+          </a:prstGeom>
+          <a:solidFill>
+            <a:srgbClr val="C00000"/>
+          </a:solidFill>
+          <a:ln>
+            <a:noFill/>
+          </a:ln>
+        </p:spPr>
+        <p:style>
+          <a:lnRef idx="2">
+            <a:schemeClr val="accent1">
+              <a:shade val="50000"/>
+            </a:schemeClr>
+          </a:lnRef>
+          <a:fillRef idx="1">
+            <a:schemeClr val="accent1"/>
+          </a:fillRef>
+          <a:effectRef idx="0">
+            <a:schemeClr val="accent1"/>
+          </a:effectRef>
+          <a:fontRef idx="minor">
+            <a:schemeClr val="lt1"/>
+          </a:fontRef>
+        </p:style>
+        <p:txBody>
+          <a:bodyPr rtlCol="0" anchor="ctr"/>
+          <a:lstStyle/>
+          <a:p>
+            <a:pPr algn="ctr"/>
+            <a:endParaRPr lang="en-US" dirty="0"/>
+          </a:p>
+        </p:txBody>
+      </p:sp>
+      <p:sp>
+        <p:nvSpPr>
+          <p:cNvPr id="32" name="Oval 31">
+            <a:extLst>
+              <a:ext uri="{FF2B5EF4-FFF2-40B4-BE49-F238E27FC236}">
+                <a16:creationId xmlns:a16="http://schemas.microsoft.com/office/drawing/2014/main" id="{35DDFB7A-DD64-1A41-A197-4CA70014CACC}"/>
+              </a:ext>
+            </a:extLst>
+          </p:cNvPr>
+          <p:cNvSpPr/>
+          <p:nvPr/>
+        </p:nvSpPr>
+        <p:spPr>
+          <a:xfrm>
+            <a:off x="5229745" y="2354233"/>
+            <a:ext cx="137160" cy="137160"/>
+          </a:xfrm>
+          <a:prstGeom prst="ellipse">
+            <a:avLst/>
+          </a:prstGeom>
+          <a:solidFill>
+            <a:schemeClr val="tx1"/>
+          </a:solidFill>
+          <a:ln>
+            <a:noFill/>
+          </a:ln>
+        </p:spPr>
+        <p:style>
+          <a:lnRef idx="2">
+            <a:schemeClr val="accent1">
+              <a:shade val="50000"/>
+            </a:schemeClr>
+          </a:lnRef>
+          <a:fillRef idx="1">
+            <a:schemeClr val="accent1"/>
+          </a:fillRef>
+          <a:effectRef idx="0">
+            <a:schemeClr val="accent1"/>
+          </a:effectRef>
+          <a:fontRef idx="minor">
+            <a:schemeClr val="lt1"/>
+          </a:fontRef>
+        </p:style>
+        <p:txBody>
+          <a:bodyPr rtlCol="0" anchor="ctr"/>
+          <a:lstStyle/>
+          <a:p>
+            <a:pPr algn="ctr"/>
+            <a:endParaRPr lang="en-US" dirty="0"/>
+          </a:p>
+        </p:txBody>
+      </p:sp>
+      <mc:AlternateContent xmlns:mc="http://schemas.openxmlformats.org/markup-compatibility/2006">
+        <mc:Choice xmlns:a14="http://schemas.microsoft.com/office/drawing/2010/main" Requires="a14">
+          <p:sp>
+            <p:nvSpPr>
+              <p:cNvPr id="33" name="TextBox 32">
+                <a:extLst>
+                  <a:ext uri="{FF2B5EF4-FFF2-40B4-BE49-F238E27FC236}">
+                    <a16:creationId xmlns:a16="http://schemas.microsoft.com/office/drawing/2014/main" id="{B632A0C6-5835-8D44-BB89-B6F6A795201F}"/>
+                  </a:ext>
+                </a:extLst>
+              </p:cNvPr>
+              <p:cNvSpPr txBox="1"/>
+              <p:nvPr/>
+            </p:nvSpPr>
+            <p:spPr>
+              <a:xfrm>
+                <a:off x="3432768" y="3597973"/>
+                <a:ext cx="141705" cy="215444"/>
+              </a:xfrm>
+              <a:prstGeom prst="rect">
+                <a:avLst/>
+              </a:prstGeom>
+              <a:noFill/>
+            </p:spPr>
+            <p:txBody>
+              <a:bodyPr wrap="none" lIns="0" tIns="0" rIns="0" bIns="0" rtlCol="0">
+                <a:spAutoFit/>
+              </a:bodyPr>
+              <a:lstStyle/>
+              <a:p>
+                <a14:m>
+                  <m:oMathPara xmlns:m="http://schemas.openxmlformats.org/officeDocument/2006/math">
+                    <m:oMathParaPr>
+                      <m:jc m:val="centerGroup"/>
+                    </m:oMathParaPr>
+                    <m:oMath xmlns:m="http://schemas.openxmlformats.org/officeDocument/2006/math">
+                      <m:r>
+                        <a:rPr lang="en-US" sz="1400" b="0" i="1" smtClean="0">
+                          <a:latin typeface="Cambria Math" panose="02040503050406030204" pitchFamily="18" charset="0"/>
+                        </a:rPr>
+                        <m:t>𝑥</m:t>
+                      </m:r>
+                    </m:oMath>
+                  </m:oMathPara>
+                </a14:m>
+                <a:endParaRPr lang="en-US" sz="1400" dirty="0"/>
+              </a:p>
+            </p:txBody>
+          </p:sp>
+        </mc:Choice>
+        <mc:Fallback>
+          <p:sp>
+            <p:nvSpPr>
+              <p:cNvPr id="33" name="TextBox 32">
+                <a:extLst>
+                  <a:ext uri="{FF2B5EF4-FFF2-40B4-BE49-F238E27FC236}">
+                    <a16:creationId xmlns:a16="http://schemas.microsoft.com/office/drawing/2014/main" id="{B632A0C6-5835-8D44-BB89-B6F6A795201F}"/>
+                  </a:ext>
+                </a:extLst>
+              </p:cNvPr>
+              <p:cNvSpPr txBox="1">
+                <a:spLocks noRot="1" noChangeAspect="1" noMove="1" noResize="1" noEditPoints="1" noAdjustHandles="1" noChangeArrowheads="1" noChangeShapeType="1" noTextEdit="1"/>
+              </p:cNvSpPr>
+              <p:nvPr/>
+            </p:nvSpPr>
+            <p:spPr>
+              <a:xfrm>
+                <a:off x="3432768" y="3597973"/>
+                <a:ext cx="141705" cy="215444"/>
+              </a:xfrm>
+              <a:prstGeom prst="rect">
+                <a:avLst/>
+              </a:prstGeom>
+              <a:blipFill>
+                <a:blip r:embed="rId2"/>
+                <a:stretch>
+                  <a:fillRect l="-18182" r="-18182"/>
+                </a:stretch>
+              </a:blipFill>
+            </p:spPr>
+            <p:txBody>
+              <a:bodyPr/>
+              <a:lstStyle/>
+              <a:p>
+                <a:r>
+                  <a:rPr lang="en-US">
+                    <a:noFill/>
+                  </a:rPr>
+                  <a:t> </a:t>
+                </a:r>
+              </a:p>
+            </p:txBody>
+          </p:sp>
+        </mc:Fallback>
+      </mc:AlternateContent>
+      <mc:AlternateContent xmlns:mc="http://schemas.openxmlformats.org/markup-compatibility/2006">
+        <mc:Choice xmlns:a14="http://schemas.microsoft.com/office/drawing/2010/main" Requires="a14">
+          <p:sp>
+            <p:nvSpPr>
+              <p:cNvPr id="35" name="TextBox 34">
+                <a:extLst>
+                  <a:ext uri="{FF2B5EF4-FFF2-40B4-BE49-F238E27FC236}">
+                    <a16:creationId xmlns:a16="http://schemas.microsoft.com/office/drawing/2014/main" id="{37161571-02B7-D64D-A23C-41D7BC812B78}"/>
+                  </a:ext>
+                </a:extLst>
+              </p:cNvPr>
+              <p:cNvSpPr txBox="1"/>
+              <p:nvPr/>
+            </p:nvSpPr>
+            <p:spPr>
+              <a:xfrm>
+                <a:off x="6177148" y="1751424"/>
+                <a:ext cx="144142" cy="215444"/>
+              </a:xfrm>
+              <a:prstGeom prst="rect">
+                <a:avLst/>
+              </a:prstGeom>
+              <a:noFill/>
+            </p:spPr>
+            <p:txBody>
+              <a:bodyPr wrap="none" lIns="0" tIns="0" rIns="0" bIns="0" rtlCol="0">
+                <a:spAutoFit/>
+              </a:bodyPr>
+              <a:lstStyle/>
+              <a:p>
+                <a14:m>
+                  <m:oMathPara xmlns:m="http://schemas.openxmlformats.org/officeDocument/2006/math">
+                    <m:oMathParaPr>
+                      <m:jc m:val="centerGroup"/>
+                    </m:oMathParaPr>
+                    <m:oMath xmlns:m="http://schemas.openxmlformats.org/officeDocument/2006/math">
+                      <m:r>
+                        <a:rPr lang="en-US" sz="1400" b="0" i="1" smtClean="0">
+                          <a:latin typeface="Cambria Math" panose="02040503050406030204" pitchFamily="18" charset="0"/>
+                        </a:rPr>
+                        <m:t>𝑦</m:t>
+                      </m:r>
+                    </m:oMath>
+                  </m:oMathPara>
+                </a14:m>
+                <a:endParaRPr lang="en-US" sz="1400" dirty="0"/>
+              </a:p>
+            </p:txBody>
+          </p:sp>
+        </mc:Choice>
+        <mc:Fallback>
+          <p:sp>
+            <p:nvSpPr>
+              <p:cNvPr id="35" name="TextBox 34">
+                <a:extLst>
+                  <a:ext uri="{FF2B5EF4-FFF2-40B4-BE49-F238E27FC236}">
+                    <a16:creationId xmlns:a16="http://schemas.microsoft.com/office/drawing/2014/main" id="{37161571-02B7-D64D-A23C-41D7BC812B78}"/>
+                  </a:ext>
+                </a:extLst>
+              </p:cNvPr>
+              <p:cNvSpPr txBox="1">
+                <a:spLocks noRot="1" noChangeAspect="1" noMove="1" noResize="1" noEditPoints="1" noAdjustHandles="1" noChangeArrowheads="1" noChangeShapeType="1" noTextEdit="1"/>
+              </p:cNvSpPr>
+              <p:nvPr/>
+            </p:nvSpPr>
+            <p:spPr>
+              <a:xfrm>
+                <a:off x="6177148" y="1751424"/>
+                <a:ext cx="144142" cy="215444"/>
+              </a:xfrm>
+              <a:prstGeom prst="rect">
+                <a:avLst/>
+              </a:prstGeom>
+              <a:blipFill>
+                <a:blip r:embed="rId3"/>
+                <a:stretch>
+                  <a:fillRect l="-36364" r="-36364" b="-22222"/>
+                </a:stretch>
+              </a:blipFill>
+            </p:spPr>
+            <p:txBody>
+              <a:bodyPr/>
+              <a:lstStyle/>
+              <a:p>
+                <a:r>
+                  <a:rPr lang="en-US">
+                    <a:noFill/>
+                  </a:rPr>
+                  <a:t> </a:t>
+                </a:r>
+              </a:p>
+            </p:txBody>
+          </p:sp>
+        </mc:Fallback>
+      </mc:AlternateContent>
+      <mc:AlternateContent xmlns:mc="http://schemas.openxmlformats.org/markup-compatibility/2006">
+        <mc:Choice xmlns:a14="http://schemas.microsoft.com/office/drawing/2010/main" Requires="a14">
+          <p:sp>
+            <p:nvSpPr>
+              <p:cNvPr id="37" name="TextBox 36">
+                <a:extLst>
+                  <a:ext uri="{FF2B5EF4-FFF2-40B4-BE49-F238E27FC236}">
+                    <a16:creationId xmlns:a16="http://schemas.microsoft.com/office/drawing/2014/main" id="{A69C00E3-D869-1142-AEED-49E8CCCBDCB9}"/>
+                  </a:ext>
+                </a:extLst>
+              </p:cNvPr>
+              <p:cNvSpPr txBox="1"/>
+              <p:nvPr/>
+            </p:nvSpPr>
+            <p:spPr>
+              <a:xfrm>
+                <a:off x="3869550" y="2262688"/>
+                <a:ext cx="1469555" cy="215444"/>
+              </a:xfrm>
+              <a:prstGeom prst="rect">
+                <a:avLst/>
+              </a:prstGeom>
+              <a:noFill/>
+            </p:spPr>
+            <p:txBody>
+              <a:bodyPr wrap="square" lIns="0" tIns="0" rIns="0" bIns="0" rtlCol="0">
+                <a:spAutoFit/>
+              </a:bodyPr>
+              <a:lstStyle/>
+              <a:p>
+                <a14:m>
+                  <m:oMathPara xmlns:m="http://schemas.openxmlformats.org/officeDocument/2006/math">
+                    <m:oMathParaPr>
+                      <m:jc m:val="centerGroup"/>
+                    </m:oMathParaPr>
+                    <m:oMath xmlns:m="http://schemas.openxmlformats.org/officeDocument/2006/math">
+                      <m:r>
+                        <a:rPr lang="en-US" sz="1400" b="0" i="1" smtClean="0">
+                          <a:latin typeface="Cambria Math" panose="02040503050406030204" pitchFamily="18" charset="0"/>
+                        </a:rPr>
+                        <m:t>𝜆</m:t>
+                      </m:r>
+                      <m:r>
+                        <a:rPr lang="en-US" sz="1400" b="0" i="1" smtClean="0">
+                          <a:latin typeface="Cambria Math" panose="02040503050406030204" pitchFamily="18" charset="0"/>
+                        </a:rPr>
+                        <m:t>𝑥</m:t>
+                      </m:r>
+                      <m:r>
+                        <a:rPr lang="en-US" sz="1400" b="0" i="1" smtClean="0">
+                          <a:latin typeface="Cambria Math" panose="02040503050406030204" pitchFamily="18" charset="0"/>
+                        </a:rPr>
+                        <m:t>+</m:t>
+                      </m:r>
+                      <m:d>
+                        <m:dPr>
+                          <m:ctrlPr>
+                            <a:rPr lang="en-US" sz="1400" b="0" i="1" smtClean="0">
+                              <a:latin typeface="Cambria Math" panose="02040503050406030204" pitchFamily="18" charset="0"/>
+                            </a:rPr>
+                          </m:ctrlPr>
+                        </m:dPr>
+                        <m:e>
+                          <m:r>
+                            <a:rPr lang="en-US" sz="1400" b="0" i="1" smtClean="0">
+                              <a:latin typeface="Cambria Math" panose="02040503050406030204" pitchFamily="18" charset="0"/>
+                            </a:rPr>
+                            <m:t>1−</m:t>
+                          </m:r>
+                          <m:r>
+                            <a:rPr lang="en-US" sz="1400" b="0" i="1" smtClean="0">
+                              <a:latin typeface="Cambria Math" panose="02040503050406030204" pitchFamily="18" charset="0"/>
+                            </a:rPr>
+                            <m:t>𝜆</m:t>
+                          </m:r>
+                        </m:e>
+                      </m:d>
+                      <m:r>
+                        <a:rPr lang="en-US" sz="1400" b="0" i="1" smtClean="0">
+                          <a:latin typeface="Cambria Math" panose="02040503050406030204" pitchFamily="18" charset="0"/>
+                        </a:rPr>
+                        <m:t>𝑦</m:t>
+                      </m:r>
+                    </m:oMath>
+                  </m:oMathPara>
+                </a14:m>
+                <a:endParaRPr lang="en-US" sz="1400" dirty="0"/>
+              </a:p>
+            </p:txBody>
+          </p:sp>
+        </mc:Choice>
+        <mc:Fallback>
+          <p:sp>
+            <p:nvSpPr>
+              <p:cNvPr id="37" name="TextBox 36">
+                <a:extLst>
+                  <a:ext uri="{FF2B5EF4-FFF2-40B4-BE49-F238E27FC236}">
+                    <a16:creationId xmlns:a16="http://schemas.microsoft.com/office/drawing/2014/main" id="{A69C00E3-D869-1142-AEED-49E8CCCBDCB9}"/>
+                  </a:ext>
+                </a:extLst>
+              </p:cNvPr>
+              <p:cNvSpPr txBox="1">
+                <a:spLocks noRot="1" noChangeAspect="1" noMove="1" noResize="1" noEditPoints="1" noAdjustHandles="1" noChangeArrowheads="1" noChangeShapeType="1" noTextEdit="1"/>
+              </p:cNvSpPr>
+              <p:nvPr/>
+            </p:nvSpPr>
+            <p:spPr>
+              <a:xfrm>
+                <a:off x="3869550" y="2262688"/>
+                <a:ext cx="1469555" cy="215444"/>
+              </a:xfrm>
+              <a:prstGeom prst="rect">
+                <a:avLst/>
+              </a:prstGeom>
+              <a:blipFill>
+                <a:blip r:embed="rId4"/>
+                <a:stretch>
+                  <a:fillRect b="-23529"/>
+                </a:stretch>
+              </a:blipFill>
+            </p:spPr>
+            <p:txBody>
+              <a:bodyPr/>
+              <a:lstStyle/>
+              <a:p>
+                <a:r>
+                  <a:rPr lang="en-US">
+                    <a:noFill/>
+                  </a:rPr>
+                  <a:t> </a:t>
+                </a:r>
+              </a:p>
+            </p:txBody>
+          </p:sp>
+        </mc:Fallback>
+      </mc:AlternateContent>
+    </p:spTree>
+    <p:extLst>
+      <p:ext uri="{BB962C8B-B14F-4D97-AF65-F5344CB8AC3E}">
+        <p14:creationId xmlns:p14="http://schemas.microsoft.com/office/powerpoint/2010/main" val="430692561"/>
+      </p:ext>
+    </p:extLst>
+  </p:cSld>
+  <p:clrMapOvr>
+    <a:masterClrMapping/>
+  </p:clrMapOvr>
+</p:sld>
+</file>
+
+<file path=ppt/slides/slide2.xml><?xml version="1.0" encoding="utf-8"?>
+<p:sld xmlns:a="http://schemas.openxmlformats.org/drawingml/2006/main" xmlns:r="http://schemas.openxmlformats.org/officeDocument/2006/relationships" xmlns:p="http://schemas.openxmlformats.org/presentationml/2006/main">
+  <p:cSld>
+    <p:spTree>
+      <p:nvGrpSpPr>
+        <p:cNvPr id="1" name=""/>
+        <p:cNvGrpSpPr/>
+        <p:nvPr/>
+      </p:nvGrpSpPr>
+      <p:grpSpPr>
+        <a:xfrm>
+          <a:off x="0" y="0"/>
+          <a:ext cx="0" cy="0"/>
+          <a:chOff x="0" y="0"/>
+          <a:chExt cx="0" cy="0"/>
+        </a:xfrm>
+      </p:grpSpPr>
+      <p:cxnSp>
+        <p:nvCxnSpPr>
           <p:cNvPr id="5" name="Straight Connector 4">
             <a:extLst>
               <a:ext uri="{FF2B5EF4-FFF2-40B4-BE49-F238E27FC236}">
@@ -4674,7 +5310,7 @@
 </p:sld>
 </file>
 
-<file path=ppt/slides/slide2.xml><?xml version="1.0" encoding="utf-8"?>
+<file path=ppt/slides/slide3.xml><?xml version="1.0" encoding="utf-8"?>
 <p:sld xmlns:a="http://schemas.openxmlformats.org/drawingml/2006/main" xmlns:r="http://schemas.openxmlformats.org/officeDocument/2006/relationships" xmlns:p="http://schemas.openxmlformats.org/presentationml/2006/main">
   <p:cSld>
     <p:spTree>
@@ -5437,7 +6073,7 @@
 </p:sld>
 </file>
 
-<file path=ppt/slides/slide3.xml><?xml version="1.0" encoding="utf-8"?>
+<file path=ppt/slides/slide4.xml><?xml version="1.0" encoding="utf-8"?>
 <p:sld xmlns:a="http://schemas.openxmlformats.org/drawingml/2006/main" xmlns:r="http://schemas.openxmlformats.org/officeDocument/2006/relationships" xmlns:p="http://schemas.openxmlformats.org/presentationml/2006/main">
   <p:cSld>
     <p:spTree>
@@ -6795,7 +7431,7 @@
 </p:sld>
 </file>
 
-<file path=ppt/slides/slide4.xml><?xml version="1.0" encoding="utf-8"?>
+<file path=ppt/slides/slide5.xml><?xml version="1.0" encoding="utf-8"?>
 <p:sld xmlns:a="http://schemas.openxmlformats.org/drawingml/2006/main" xmlns:r="http://schemas.openxmlformats.org/officeDocument/2006/relationships" xmlns:p="http://schemas.openxmlformats.org/presentationml/2006/main">
   <p:cSld>
     <p:spTree>
@@ -6882,45 +7518,6 @@
           </a:p>
         </p:txBody>
       </p:sp>
-      <p:cxnSp>
-        <p:nvCxnSpPr>
-          <p:cNvPr id="4" name="Straight Connector 3">
-            <a:extLst>
-              <a:ext uri="{FF2B5EF4-FFF2-40B4-BE49-F238E27FC236}">
-                <a16:creationId xmlns:a16="http://schemas.microsoft.com/office/drawing/2014/main" id="{2FA219EB-BA64-064B-B262-BF2EC5F8E451}"/>
-              </a:ext>
-            </a:extLst>
-          </p:cNvPr>
-          <p:cNvCxnSpPr>
-            <a:cxnSpLocks/>
-          </p:cNvCxnSpPr>
-          <p:nvPr/>
-        </p:nvCxnSpPr>
-        <p:spPr>
-          <a:xfrm rot="5400000" flipH="1">
-            <a:off x="4951927" y="2994339"/>
-            <a:ext cx="0" cy="4082602"/>
-          </a:xfrm>
-          <a:prstGeom prst="line">
-            <a:avLst/>
-          </a:prstGeom>
-          <a:ln w="25400"/>
-        </p:spPr>
-        <p:style>
-          <a:lnRef idx="1">
-            <a:schemeClr val="dk1"/>
-          </a:lnRef>
-          <a:fillRef idx="0">
-            <a:schemeClr val="dk1"/>
-          </a:fillRef>
-          <a:effectRef idx="0">
-            <a:schemeClr val="dk1"/>
-          </a:effectRef>
-          <a:fontRef idx="minor">
-            <a:schemeClr val="tx1"/>
-          </a:fontRef>
-        </p:style>
-      </p:cxnSp>
       <p:cxnSp>
         <p:nvCxnSpPr>
           <p:cNvPr id="5" name="Straight Connector 4">
@@ -7755,8 +8352,8 @@
         </p:nvSpPr>
         <p:spPr>
           <a:xfrm>
-            <a:off x="3830855" y="3205213"/>
-            <a:ext cx="2300438" cy="1838425"/>
+            <a:off x="3830854" y="3205214"/>
+            <a:ext cx="1732027" cy="1845276"/>
           </a:xfrm>
           <a:custGeom>
             <a:avLst/>
@@ -7771,6 +8368,16 @@
               <a:gd name="connsiteY3" fmla="*/ 1010652 h 1838425"/>
               <a:gd name="connsiteX4" fmla="*/ 0 w 2300438"/>
               <a:gd name="connsiteY4" fmla="*/ 0 h 1838425"/>
+              <a:gd name="connsiteX0" fmla="*/ 0 w 1732027"/>
+              <a:gd name="connsiteY0" fmla="*/ 0 h 1845276"/>
+              <a:gd name="connsiteX1" fmla="*/ 1270534 w 1732027"/>
+              <a:gd name="connsiteY1" fmla="*/ 1838425 h 1845276"/>
+              <a:gd name="connsiteX2" fmla="*/ 1732027 w 1732027"/>
+              <a:gd name="connsiteY2" fmla="*/ 1845276 h 1845276"/>
+              <a:gd name="connsiteX3" fmla="*/ 1718109 w 1732027"/>
+              <a:gd name="connsiteY3" fmla="*/ 1010652 h 1845276"/>
+              <a:gd name="connsiteX4" fmla="*/ 0 w 1732027"/>
+              <a:gd name="connsiteY4" fmla="*/ 0 h 1845276"/>
             </a:gdLst>
             <a:ahLst/>
             <a:cxnLst>
@@ -7792,7 +8399,7 @@
             </a:cxnLst>
             <a:rect l="l" t="t" r="r" b="b"/>
             <a:pathLst>
-              <a:path w="2300438" h="1838425">
+              <a:path w="1732027" h="1845276">
                 <a:moveTo>
                   <a:pt x="0" y="0"/>
                 </a:moveTo>
@@ -7800,7 +8407,7 @@
                   <a:pt x="1270534" y="1838425"/>
                 </a:lnTo>
                 <a:lnTo>
-                  <a:pt x="2300438" y="1828800"/>
+                  <a:pt x="1732027" y="1845276"/>
                 </a:lnTo>
                 <a:lnTo>
                   <a:pt x="1718109" y="1010652"/>
@@ -7844,7 +8451,7 @@
           <a:lstStyle/>
           <a:p>
             <a:pPr algn="ctr"/>
-            <a:endParaRPr lang="en-US"/>
+            <a:endParaRPr lang="en-US" dirty="0"/>
           </a:p>
         </p:txBody>
       </p:sp>
@@ -8078,6 +8685,45 @@
           </a:p>
         </p:txBody>
       </p:sp>
+      <p:cxnSp>
+        <p:nvCxnSpPr>
+          <p:cNvPr id="4" name="Straight Connector 3">
+            <a:extLst>
+              <a:ext uri="{FF2B5EF4-FFF2-40B4-BE49-F238E27FC236}">
+                <a16:creationId xmlns:a16="http://schemas.microsoft.com/office/drawing/2014/main" id="{2FA219EB-BA64-064B-B262-BF2EC5F8E451}"/>
+              </a:ext>
+            </a:extLst>
+          </p:cNvPr>
+          <p:cNvCxnSpPr>
+            <a:cxnSpLocks/>
+          </p:cNvCxnSpPr>
+          <p:nvPr/>
+        </p:nvCxnSpPr>
+        <p:spPr>
+          <a:xfrm rot="5400000" flipH="1">
+            <a:off x="4951927" y="2994339"/>
+            <a:ext cx="0" cy="4082602"/>
+          </a:xfrm>
+          <a:prstGeom prst="line">
+            <a:avLst/>
+          </a:prstGeom>
+          <a:ln w="25400"/>
+        </p:spPr>
+        <p:style>
+          <a:lnRef idx="1">
+            <a:schemeClr val="dk1"/>
+          </a:lnRef>
+          <a:fillRef idx="0">
+            <a:schemeClr val="dk1"/>
+          </a:fillRef>
+          <a:effectRef idx="0">
+            <a:schemeClr val="dk1"/>
+          </a:effectRef>
+          <a:fontRef idx="minor">
+            <a:schemeClr val="tx1"/>
+          </a:fontRef>
+        </p:style>
+      </p:cxnSp>
     </p:spTree>
     <p:extLst>
       <p:ext uri="{BB962C8B-B14F-4D97-AF65-F5344CB8AC3E}">

</xml_diff>